<commit_message>
add your data support pe
</commit_message>
<xml_diff>
--- a/images/azure-openai-add-your-data-procon/addyourdataarch.pptx
+++ b/images/azure-openai-add-your-data-procon/addyourdataarch.pptx
@@ -7,7 +7,8 @@
   <p:sldIdLst>
     <p:sldId id="256" r:id="rId2"/>
     <p:sldId id="257" r:id="rId3"/>
-    <p:sldId id="258" r:id="rId4"/>
+    <p:sldId id="259" r:id="rId4"/>
+    <p:sldId id="258" r:id="rId5"/>
   </p:sldIdLst>
   <p:sldSz cx="12192000" cy="6858000"/>
   <p:notesSz cx="6858000" cy="9144000"/>
@@ -106,6 +107,11 @@
       </a:defRPr>
     </a:lvl9pPr>
   </p:defaultTextStyle>
+  <p:extLst>
+    <p:ext uri="{EFAFB233-063F-42B5-8137-9DF3F51BA10A}">
+      <p15:sldGuideLst xmlns:p15="http://schemas.microsoft.com/office/powerpoint/2012/main"/>
+    </p:ext>
+  </p:extLst>
 </p:presentation>
 </file>
 
@@ -256,7 +262,7 @@
           <a:p>
             <a:fld id="{51DB9973-FBF8-A142-A1E5-6E47DB716AC3}" type="datetimeFigureOut">
               <a:rPr kumimoji="1" lang="ja-JP" altLang="en-US" smtClean="0"/>
-              <a:t>2023/7/4</a:t>
+              <a:t>2023/8/24</a:t>
             </a:fld>
             <a:endParaRPr kumimoji="1" lang="ja-JP" altLang="en-US"/>
           </a:p>
@@ -486,7 +492,7 @@
           <a:p>
             <a:fld id="{51DB9973-FBF8-A142-A1E5-6E47DB716AC3}" type="datetimeFigureOut">
               <a:rPr kumimoji="1" lang="ja-JP" altLang="en-US" smtClean="0"/>
-              <a:t>2023/7/4</a:t>
+              <a:t>2023/8/24</a:t>
             </a:fld>
             <a:endParaRPr kumimoji="1" lang="ja-JP" altLang="en-US"/>
           </a:p>
@@ -726,7 +732,7 @@
           <a:p>
             <a:fld id="{51DB9973-FBF8-A142-A1E5-6E47DB716AC3}" type="datetimeFigureOut">
               <a:rPr kumimoji="1" lang="ja-JP" altLang="en-US" smtClean="0"/>
-              <a:t>2023/7/4</a:t>
+              <a:t>2023/8/24</a:t>
             </a:fld>
             <a:endParaRPr kumimoji="1" lang="ja-JP" altLang="en-US"/>
           </a:p>
@@ -956,7 +962,7 @@
           <a:p>
             <a:fld id="{51DB9973-FBF8-A142-A1E5-6E47DB716AC3}" type="datetimeFigureOut">
               <a:rPr kumimoji="1" lang="ja-JP" altLang="en-US" smtClean="0"/>
-              <a:t>2023/7/4</a:t>
+              <a:t>2023/8/24</a:t>
             </a:fld>
             <a:endParaRPr kumimoji="1" lang="ja-JP" altLang="en-US"/>
           </a:p>
@@ -1231,7 +1237,7 @@
           <a:p>
             <a:fld id="{51DB9973-FBF8-A142-A1E5-6E47DB716AC3}" type="datetimeFigureOut">
               <a:rPr kumimoji="1" lang="ja-JP" altLang="en-US" smtClean="0"/>
-              <a:t>2023/7/4</a:t>
+              <a:t>2023/8/24</a:t>
             </a:fld>
             <a:endParaRPr kumimoji="1" lang="ja-JP" altLang="en-US"/>
           </a:p>
@@ -1560,7 +1566,7 @@
           <a:p>
             <a:fld id="{51DB9973-FBF8-A142-A1E5-6E47DB716AC3}" type="datetimeFigureOut">
               <a:rPr kumimoji="1" lang="ja-JP" altLang="en-US" smtClean="0"/>
-              <a:t>2023/7/4</a:t>
+              <a:t>2023/8/24</a:t>
             </a:fld>
             <a:endParaRPr kumimoji="1" lang="ja-JP" altLang="en-US"/>
           </a:p>
@@ -2036,7 +2042,7 @@
           <a:p>
             <a:fld id="{51DB9973-FBF8-A142-A1E5-6E47DB716AC3}" type="datetimeFigureOut">
               <a:rPr kumimoji="1" lang="ja-JP" altLang="en-US" smtClean="0"/>
-              <a:t>2023/7/4</a:t>
+              <a:t>2023/8/24</a:t>
             </a:fld>
             <a:endParaRPr kumimoji="1" lang="ja-JP" altLang="en-US"/>
           </a:p>
@@ -2177,7 +2183,7 @@
           <a:p>
             <a:fld id="{51DB9973-FBF8-A142-A1E5-6E47DB716AC3}" type="datetimeFigureOut">
               <a:rPr kumimoji="1" lang="ja-JP" altLang="en-US" smtClean="0"/>
-              <a:t>2023/7/4</a:t>
+              <a:t>2023/8/24</a:t>
             </a:fld>
             <a:endParaRPr kumimoji="1" lang="ja-JP" altLang="en-US"/>
           </a:p>
@@ -2327,7 +2333,7 @@
           <a:p>
             <a:fld id="{51DB9973-FBF8-A142-A1E5-6E47DB716AC3}" type="datetimeFigureOut">
               <a:rPr kumimoji="1" lang="ja-JP" altLang="en-US" smtClean="0"/>
-              <a:t>2023/7/4</a:t>
+              <a:t>2023/8/24</a:t>
             </a:fld>
             <a:endParaRPr kumimoji="1" lang="ja-JP" altLang="en-US"/>
           </a:p>
@@ -2670,7 +2676,7 @@
           <a:p>
             <a:fld id="{51DB9973-FBF8-A142-A1E5-6E47DB716AC3}" type="datetimeFigureOut">
               <a:rPr kumimoji="1" lang="ja-JP" altLang="en-US" smtClean="0"/>
-              <a:t>2023/7/4</a:t>
+              <a:t>2023/8/24</a:t>
             </a:fld>
             <a:endParaRPr kumimoji="1" lang="ja-JP" altLang="en-US"/>
           </a:p>
@@ -2958,7 +2964,7 @@
           <a:p>
             <a:fld id="{51DB9973-FBF8-A142-A1E5-6E47DB716AC3}" type="datetimeFigureOut">
               <a:rPr kumimoji="1" lang="ja-JP" altLang="en-US" smtClean="0"/>
-              <a:t>2023/7/4</a:t>
+              <a:t>2023/8/24</a:t>
             </a:fld>
             <a:endParaRPr kumimoji="1" lang="ja-JP" altLang="en-US"/>
           </a:p>
@@ -3231,7 +3237,7 @@
           <a:p>
             <a:fld id="{51DB9973-FBF8-A142-A1E5-6E47DB716AC3}" type="datetimeFigureOut">
               <a:rPr kumimoji="1" lang="ja-JP" altLang="en-US" smtClean="0"/>
-              <a:t>2023/7/4</a:t>
+              <a:t>2023/8/24</a:t>
             </a:fld>
             <a:endParaRPr kumimoji="1" lang="ja-JP" altLang="en-US"/>
           </a:p>
@@ -6033,6 +6039,1290 @@
 </file>
 
 <file path=ppt/slides/slide3.xml><?xml version="1.0" encoding="utf-8"?>
+<p:sld xmlns:a="http://schemas.openxmlformats.org/drawingml/2006/main" xmlns:r="http://schemas.openxmlformats.org/officeDocument/2006/relationships" xmlns:p="http://schemas.openxmlformats.org/presentationml/2006/main">
+  <p:cSld>
+    <p:spTree>
+      <p:nvGrpSpPr>
+        <p:cNvPr id="1" name=""/>
+        <p:cNvGrpSpPr/>
+        <p:nvPr/>
+      </p:nvGrpSpPr>
+      <p:grpSpPr>
+        <a:xfrm>
+          <a:off x="0" y="0"/>
+          <a:ext cx="0" cy="0"/>
+          <a:chOff x="0" y="0"/>
+          <a:chExt cx="0" cy="0"/>
+        </a:xfrm>
+      </p:grpSpPr>
+      <p:pic>
+        <p:nvPicPr>
+          <p:cNvPr id="5" name="グラフィックス 4">
+            <a:extLst>
+              <a:ext uri="{FF2B5EF4-FFF2-40B4-BE49-F238E27FC236}">
+                <a16:creationId xmlns:a16="http://schemas.microsoft.com/office/drawing/2014/main" id="{6FBABE0C-E538-4B19-E773-EC1DCF5E39FD}"/>
+              </a:ext>
+            </a:extLst>
+          </p:cNvPr>
+          <p:cNvPicPr>
+            <a:picLocks noChangeAspect="1"/>
+          </p:cNvPicPr>
+          <p:nvPr/>
+        </p:nvPicPr>
+        <p:blipFill>
+          <a:blip r:embed="rId2">
+            <a:extLst>
+              <a:ext uri="{96DAC541-7B7A-43D3-8B79-37D633B846F1}">
+                <asvg:svgBlip xmlns:asvg="http://schemas.microsoft.com/office/drawing/2016/SVG/main" r:embed="rId3"/>
+              </a:ext>
+            </a:extLst>
+          </a:blip>
+          <a:stretch>
+            <a:fillRect/>
+          </a:stretch>
+        </p:blipFill>
+        <p:spPr>
+          <a:xfrm>
+            <a:off x="3776963" y="1205179"/>
+            <a:ext cx="1326293" cy="1326293"/>
+          </a:xfrm>
+          <a:prstGeom prst="rect">
+            <a:avLst/>
+          </a:prstGeom>
+        </p:spPr>
+      </p:pic>
+      <p:pic>
+        <p:nvPicPr>
+          <p:cNvPr id="1026" name="Picture 2" descr="Azure OpenAI のChatGPTとPythonでちょっとだけ戯れてみる その2 - 技術的な何か。">
+            <a:extLst>
+              <a:ext uri="{FF2B5EF4-FFF2-40B4-BE49-F238E27FC236}">
+                <a16:creationId xmlns:a16="http://schemas.microsoft.com/office/drawing/2014/main" id="{A00F4042-0061-E1FE-B7E7-582815B692AB}"/>
+              </a:ext>
+            </a:extLst>
+          </p:cNvPr>
+          <p:cNvPicPr>
+            <a:picLocks noChangeAspect="1" noChangeArrowheads="1"/>
+          </p:cNvPicPr>
+          <p:nvPr/>
+        </p:nvPicPr>
+        <p:blipFill>
+          <a:blip r:embed="rId4">
+            <a:extLst>
+              <a:ext uri="{28A0092B-C50C-407E-A947-70E740481C1C}">
+                <a14:useLocalDpi xmlns:a14="http://schemas.microsoft.com/office/drawing/2010/main" val="0"/>
+              </a:ext>
+            </a:extLst>
+          </a:blip>
+          <a:srcRect/>
+          <a:stretch>
+            <a:fillRect/>
+          </a:stretch>
+        </p:blipFill>
+        <p:spPr bwMode="auto">
+          <a:xfrm>
+            <a:off x="8536764" y="4132982"/>
+            <a:ext cx="1099602" cy="1114462"/>
+          </a:xfrm>
+          <a:prstGeom prst="rect">
+            <a:avLst/>
+          </a:prstGeom>
+          <a:noFill/>
+          <a:extLst>
+            <a:ext uri="{909E8E84-426E-40DD-AFC4-6F175D3DCCD1}">
+              <a14:hiddenFill xmlns:a14="http://schemas.microsoft.com/office/drawing/2010/main">
+                <a:solidFill>
+                  <a:srgbClr val="FFFFFF"/>
+                </a:solidFill>
+              </a14:hiddenFill>
+            </a:ext>
+          </a:extLst>
+        </p:spPr>
+      </p:pic>
+      <p:sp>
+        <p:nvSpPr>
+          <p:cNvPr id="9" name="テキスト ボックス 8">
+            <a:extLst>
+              <a:ext uri="{FF2B5EF4-FFF2-40B4-BE49-F238E27FC236}">
+                <a16:creationId xmlns:a16="http://schemas.microsoft.com/office/drawing/2014/main" id="{FB6B76F5-3398-D582-402D-C0FE940DD2D4}"/>
+              </a:ext>
+            </a:extLst>
+          </p:cNvPr>
+          <p:cNvSpPr txBox="1"/>
+          <p:nvPr/>
+        </p:nvSpPr>
+        <p:spPr>
+          <a:xfrm>
+            <a:off x="8321772" y="5277054"/>
+            <a:ext cx="1529586" cy="584775"/>
+          </a:xfrm>
+          <a:prstGeom prst="rect">
+            <a:avLst/>
+          </a:prstGeom>
+          <a:noFill/>
+        </p:spPr>
+        <p:txBody>
+          <a:bodyPr wrap="none" rtlCol="0">
+            <a:spAutoFit/>
+          </a:bodyPr>
+          <a:lstStyle/>
+          <a:p>
+            <a:pPr algn="ctr"/>
+            <a:r>
+              <a:rPr kumimoji="1" lang="en-US" altLang="ja-JP" sz="1600" dirty="0"/>
+              <a:t>Azure Open AI</a:t>
+            </a:r>
+          </a:p>
+          <a:p>
+            <a:pPr algn="ctr"/>
+            <a:r>
+              <a:rPr lang="en-US" altLang="ja-JP" sz="1600" dirty="0"/>
+              <a:t>(AOAI)</a:t>
+            </a:r>
+            <a:endParaRPr kumimoji="1" lang="ja-JP" altLang="en-US" sz="1600"/>
+          </a:p>
+        </p:txBody>
+      </p:sp>
+      <p:sp>
+        <p:nvSpPr>
+          <p:cNvPr id="32" name="テキスト ボックス 31">
+            <a:extLst>
+              <a:ext uri="{FF2B5EF4-FFF2-40B4-BE49-F238E27FC236}">
+                <a16:creationId xmlns:a16="http://schemas.microsoft.com/office/drawing/2014/main" id="{41D7C128-DD78-4E44-CA2F-700B21F76F03}"/>
+              </a:ext>
+            </a:extLst>
+          </p:cNvPr>
+          <p:cNvSpPr txBox="1"/>
+          <p:nvPr/>
+        </p:nvSpPr>
+        <p:spPr>
+          <a:xfrm>
+            <a:off x="3287592" y="2362195"/>
+            <a:ext cx="2375971" cy="338554"/>
+          </a:xfrm>
+          <a:prstGeom prst="rect">
+            <a:avLst/>
+          </a:prstGeom>
+          <a:noFill/>
+        </p:spPr>
+        <p:txBody>
+          <a:bodyPr wrap="none" rtlCol="0">
+            <a:spAutoFit/>
+          </a:bodyPr>
+          <a:lstStyle/>
+          <a:p>
+            <a:r>
+              <a:rPr kumimoji="1" lang="en-US" altLang="ja-JP" sz="1600" dirty="0"/>
+              <a:t>Azure Cognitive Search</a:t>
+            </a:r>
+            <a:endParaRPr kumimoji="1" lang="ja-JP" altLang="en-US" sz="1600"/>
+          </a:p>
+        </p:txBody>
+      </p:sp>
+      <p:sp>
+        <p:nvSpPr>
+          <p:cNvPr id="2" name="正方形/長方形 1">
+            <a:extLst>
+              <a:ext uri="{FF2B5EF4-FFF2-40B4-BE49-F238E27FC236}">
+                <a16:creationId xmlns:a16="http://schemas.microsoft.com/office/drawing/2014/main" id="{870BC818-102A-1B39-3CD8-205D67E18867}"/>
+              </a:ext>
+            </a:extLst>
+          </p:cNvPr>
+          <p:cNvSpPr/>
+          <p:nvPr/>
+        </p:nvSpPr>
+        <p:spPr>
+          <a:xfrm>
+            <a:off x="2760217" y="3206750"/>
+            <a:ext cx="4676942" cy="2918987"/>
+          </a:xfrm>
+          <a:prstGeom prst="rect">
+            <a:avLst/>
+          </a:prstGeom>
+          <a:noFill/>
+          <a:ln>
+            <a:solidFill>
+              <a:srgbClr val="0070C0"/>
+            </a:solidFill>
+          </a:ln>
+        </p:spPr>
+        <p:style>
+          <a:lnRef idx="2">
+            <a:schemeClr val="accent1">
+              <a:shade val="15000"/>
+            </a:schemeClr>
+          </a:lnRef>
+          <a:fillRef idx="1">
+            <a:schemeClr val="accent1"/>
+          </a:fillRef>
+          <a:effectRef idx="0">
+            <a:schemeClr val="accent1"/>
+          </a:effectRef>
+          <a:fontRef idx="minor">
+            <a:schemeClr val="lt1"/>
+          </a:fontRef>
+        </p:style>
+        <p:txBody>
+          <a:bodyPr rtlCol="0" anchor="ctr"/>
+          <a:lstStyle/>
+          <a:p>
+            <a:pPr algn="ctr"/>
+            <a:endParaRPr kumimoji="1" lang="ja-JP" altLang="en-US"/>
+          </a:p>
+        </p:txBody>
+      </p:sp>
+      <p:pic>
+        <p:nvPicPr>
+          <p:cNvPr id="4" name="グラフィックス 3">
+            <a:extLst>
+              <a:ext uri="{FF2B5EF4-FFF2-40B4-BE49-F238E27FC236}">
+                <a16:creationId xmlns:a16="http://schemas.microsoft.com/office/drawing/2014/main" id="{8D443EE8-FFC1-CE1F-D3B2-D79B09E0FFA2}"/>
+              </a:ext>
+            </a:extLst>
+          </p:cNvPr>
+          <p:cNvPicPr>
+            <a:picLocks noChangeAspect="1"/>
+          </p:cNvPicPr>
+          <p:nvPr/>
+        </p:nvPicPr>
+        <p:blipFill>
+          <a:blip r:embed="rId5">
+            <a:extLst>
+              <a:ext uri="{96DAC541-7B7A-43D3-8B79-37D633B846F1}">
+                <asvg:svgBlip xmlns:asvg="http://schemas.microsoft.com/office/drawing/2016/SVG/main" r:embed="rId6"/>
+              </a:ext>
+            </a:extLst>
+          </a:blip>
+          <a:stretch>
+            <a:fillRect/>
+          </a:stretch>
+        </p:blipFill>
+        <p:spPr>
+          <a:xfrm>
+            <a:off x="4409276" y="5688915"/>
+            <a:ext cx="512965" cy="512965"/>
+          </a:xfrm>
+          <a:prstGeom prst="rect">
+            <a:avLst/>
+          </a:prstGeom>
+        </p:spPr>
+      </p:pic>
+      <p:pic>
+        <p:nvPicPr>
+          <p:cNvPr id="15" name="グラフィックス 14">
+            <a:extLst>
+              <a:ext uri="{FF2B5EF4-FFF2-40B4-BE49-F238E27FC236}">
+                <a16:creationId xmlns:a16="http://schemas.microsoft.com/office/drawing/2014/main" id="{BBA6AEB0-D65B-6913-6A8A-746288CB1E17}"/>
+              </a:ext>
+            </a:extLst>
+          </p:cNvPr>
+          <p:cNvPicPr>
+            <a:picLocks noChangeAspect="1"/>
+          </p:cNvPicPr>
+          <p:nvPr/>
+        </p:nvPicPr>
+        <p:blipFill>
+          <a:blip r:embed="rId7">
+            <a:extLst>
+              <a:ext uri="{96DAC541-7B7A-43D3-8B79-37D633B846F1}">
+                <asvg:svgBlip xmlns:asvg="http://schemas.microsoft.com/office/drawing/2016/SVG/main" r:embed="rId8"/>
+              </a:ext>
+            </a:extLst>
+          </a:blip>
+          <a:stretch>
+            <a:fillRect/>
+          </a:stretch>
+        </p:blipFill>
+        <p:spPr>
+          <a:xfrm>
+            <a:off x="8800702" y="1569435"/>
+            <a:ext cx="571726" cy="571726"/>
+          </a:xfrm>
+          <a:prstGeom prst="rect">
+            <a:avLst/>
+          </a:prstGeom>
+        </p:spPr>
+      </p:pic>
+      <p:pic>
+        <p:nvPicPr>
+          <p:cNvPr id="20" name="グラフィックス 19">
+            <a:extLst>
+              <a:ext uri="{FF2B5EF4-FFF2-40B4-BE49-F238E27FC236}">
+                <a16:creationId xmlns:a16="http://schemas.microsoft.com/office/drawing/2014/main" id="{92BAB59B-B738-C243-34D7-5E800C591ACC}"/>
+              </a:ext>
+            </a:extLst>
+          </p:cNvPr>
+          <p:cNvPicPr>
+            <a:picLocks noChangeAspect="1"/>
+          </p:cNvPicPr>
+          <p:nvPr/>
+        </p:nvPicPr>
+        <p:blipFill>
+          <a:blip r:embed="rId9">
+            <a:extLst>
+              <a:ext uri="{96DAC541-7B7A-43D3-8B79-37D633B846F1}">
+                <asvg:svgBlip xmlns:asvg="http://schemas.microsoft.com/office/drawing/2016/SVG/main" r:embed="rId10"/>
+              </a:ext>
+            </a:extLst>
+          </a:blip>
+          <a:stretch>
+            <a:fillRect/>
+          </a:stretch>
+        </p:blipFill>
+        <p:spPr>
+          <a:xfrm>
+            <a:off x="724540" y="4122107"/>
+            <a:ext cx="1136214" cy="1136214"/>
+          </a:xfrm>
+          <a:prstGeom prst="rect">
+            <a:avLst/>
+          </a:prstGeom>
+        </p:spPr>
+      </p:pic>
+      <p:sp>
+        <p:nvSpPr>
+          <p:cNvPr id="23" name="テキスト ボックス 22">
+            <a:extLst>
+              <a:ext uri="{FF2B5EF4-FFF2-40B4-BE49-F238E27FC236}">
+                <a16:creationId xmlns:a16="http://schemas.microsoft.com/office/drawing/2014/main" id="{B438DA8D-422C-6496-9891-CBE18F242337}"/>
+              </a:ext>
+            </a:extLst>
+          </p:cNvPr>
+          <p:cNvSpPr txBox="1"/>
+          <p:nvPr/>
+        </p:nvSpPr>
+        <p:spPr>
+          <a:xfrm>
+            <a:off x="268793" y="6202835"/>
+            <a:ext cx="7600157" cy="276999"/>
+          </a:xfrm>
+          <a:prstGeom prst="rect">
+            <a:avLst/>
+          </a:prstGeom>
+          <a:noFill/>
+        </p:spPr>
+        <p:txBody>
+          <a:bodyPr wrap="none" rtlCol="0">
+            <a:spAutoFit/>
+          </a:bodyPr>
+          <a:lstStyle/>
+          <a:p>
+            <a:r>
+              <a:rPr kumimoji="1" lang="en-US" altLang="ja-JP" sz="1200" dirty="0"/>
+              <a:t>※</a:t>
+            </a:r>
+            <a:r>
+              <a:rPr kumimoji="1" lang="ja-JP" altLang="en-US" sz="1200"/>
+              <a:t>正確には</a:t>
+            </a:r>
+            <a:r>
+              <a:rPr kumimoji="1" lang="en-US" altLang="ja-JP" sz="1200" dirty="0"/>
+              <a:t>VNet</a:t>
+            </a:r>
+            <a:r>
+              <a:rPr kumimoji="1" lang="ja-JP" altLang="en-US" sz="1200"/>
+              <a:t>の中に</a:t>
+            </a:r>
+            <a:r>
+              <a:rPr kumimoji="1" lang="en-US" altLang="ja-JP" sz="1200" dirty="0"/>
+              <a:t>Subnet</a:t>
+            </a:r>
+            <a:r>
+              <a:rPr kumimoji="1" lang="ja-JP" altLang="en-US" sz="1200"/>
+              <a:t>が必要ですが、ここでは重要ではないので見やすさのために省略しています。</a:t>
+            </a:r>
+          </a:p>
+        </p:txBody>
+      </p:sp>
+      <p:sp>
+        <p:nvSpPr>
+          <p:cNvPr id="24" name="テキスト ボックス 23">
+            <a:extLst>
+              <a:ext uri="{FF2B5EF4-FFF2-40B4-BE49-F238E27FC236}">
+                <a16:creationId xmlns:a16="http://schemas.microsoft.com/office/drawing/2014/main" id="{DD88F8E3-5C39-A2CD-8757-5573671041EF}"/>
+              </a:ext>
+            </a:extLst>
+          </p:cNvPr>
+          <p:cNvSpPr txBox="1"/>
+          <p:nvPr/>
+        </p:nvSpPr>
+        <p:spPr>
+          <a:xfrm>
+            <a:off x="4901736" y="5776121"/>
+            <a:ext cx="2651688" cy="338554"/>
+          </a:xfrm>
+          <a:prstGeom prst="rect">
+            <a:avLst/>
+          </a:prstGeom>
+          <a:noFill/>
+        </p:spPr>
+        <p:txBody>
+          <a:bodyPr wrap="none" rtlCol="0">
+            <a:spAutoFit/>
+          </a:bodyPr>
+          <a:lstStyle/>
+          <a:p>
+            <a:r>
+              <a:rPr kumimoji="1" lang="en-US" altLang="ja-JP" sz="1600" dirty="0"/>
+              <a:t>VNet(</a:t>
+            </a:r>
+            <a:r>
+              <a:rPr kumimoji="1" lang="ja-JP" altLang="en-US" sz="1600"/>
+              <a:t>プライベート</a:t>
+            </a:r>
+            <a:r>
+              <a:rPr kumimoji="1" lang="en-US" altLang="ja-JP" sz="1600" dirty="0"/>
+              <a:t>IP</a:t>
+            </a:r>
+            <a:r>
+              <a:rPr kumimoji="1" lang="ja-JP" altLang="en-US" sz="1600"/>
+              <a:t>空間</a:t>
+            </a:r>
+            <a:r>
+              <a:rPr kumimoji="1" lang="en-US" altLang="ja-JP" sz="1600" dirty="0"/>
+              <a:t>)</a:t>
+            </a:r>
+            <a:endParaRPr kumimoji="1" lang="ja-JP" altLang="en-US" sz="1600"/>
+          </a:p>
+        </p:txBody>
+      </p:sp>
+      <p:sp>
+        <p:nvSpPr>
+          <p:cNvPr id="26" name="テキスト ボックス 25">
+            <a:extLst>
+              <a:ext uri="{FF2B5EF4-FFF2-40B4-BE49-F238E27FC236}">
+                <a16:creationId xmlns:a16="http://schemas.microsoft.com/office/drawing/2014/main" id="{75B19C95-C50C-BF81-AA9F-094D4846CD92}"/>
+              </a:ext>
+            </a:extLst>
+          </p:cNvPr>
+          <p:cNvSpPr txBox="1"/>
+          <p:nvPr/>
+        </p:nvSpPr>
+        <p:spPr>
+          <a:xfrm>
+            <a:off x="275626" y="5289855"/>
+            <a:ext cx="2031325" cy="338554"/>
+          </a:xfrm>
+          <a:prstGeom prst="rect">
+            <a:avLst/>
+          </a:prstGeom>
+          <a:noFill/>
+        </p:spPr>
+        <p:txBody>
+          <a:bodyPr wrap="none" rtlCol="0">
+            <a:spAutoFit/>
+          </a:bodyPr>
+          <a:lstStyle/>
+          <a:p>
+            <a:r>
+              <a:rPr kumimoji="1" lang="ja-JP" altLang="en-US" sz="1600"/>
+              <a:t>クライアントアプリ</a:t>
+            </a:r>
+          </a:p>
+        </p:txBody>
+      </p:sp>
+      <p:sp>
+        <p:nvSpPr>
+          <p:cNvPr id="27" name="テキスト ボックス 26">
+            <a:extLst>
+              <a:ext uri="{FF2B5EF4-FFF2-40B4-BE49-F238E27FC236}">
+                <a16:creationId xmlns:a16="http://schemas.microsoft.com/office/drawing/2014/main" id="{00E4893F-E589-2427-9026-D06ECE9A821C}"/>
+              </a:ext>
+            </a:extLst>
+          </p:cNvPr>
+          <p:cNvSpPr txBox="1"/>
+          <p:nvPr/>
+        </p:nvSpPr>
+        <p:spPr>
+          <a:xfrm>
+            <a:off x="8303400" y="2118784"/>
+            <a:ext cx="1754006" cy="338554"/>
+          </a:xfrm>
+          <a:prstGeom prst="rect">
+            <a:avLst/>
+          </a:prstGeom>
+          <a:noFill/>
+        </p:spPr>
+        <p:txBody>
+          <a:bodyPr wrap="none" rtlCol="0">
+            <a:spAutoFit/>
+          </a:bodyPr>
+          <a:lstStyle/>
+          <a:p>
+            <a:r>
+              <a:rPr kumimoji="1" lang="en-US" altLang="ja-JP" sz="1600" dirty="0"/>
+              <a:t>Private Endpoint</a:t>
+            </a:r>
+            <a:endParaRPr kumimoji="1" lang="ja-JP" altLang="en-US" sz="1600"/>
+          </a:p>
+        </p:txBody>
+      </p:sp>
+      <p:cxnSp>
+        <p:nvCxnSpPr>
+          <p:cNvPr id="31" name="直線コネクタ 30">
+            <a:extLst>
+              <a:ext uri="{FF2B5EF4-FFF2-40B4-BE49-F238E27FC236}">
+                <a16:creationId xmlns:a16="http://schemas.microsoft.com/office/drawing/2014/main" id="{B42FDD0B-4A06-8281-8005-9E2C1597EDA6}"/>
+              </a:ext>
+            </a:extLst>
+          </p:cNvPr>
+          <p:cNvCxnSpPr>
+            <a:cxnSpLocks/>
+            <a:stCxn id="5" idx="3"/>
+            <a:endCxn id="15" idx="1"/>
+          </p:cNvCxnSpPr>
+          <p:nvPr/>
+        </p:nvCxnSpPr>
+        <p:spPr>
+          <a:xfrm flipV="1">
+            <a:off x="5103256" y="1855298"/>
+            <a:ext cx="3697446" cy="13028"/>
+          </a:xfrm>
+          <a:prstGeom prst="line">
+            <a:avLst/>
+          </a:prstGeom>
+          <a:ln w="19050">
+            <a:solidFill>
+              <a:srgbClr val="0070C0"/>
+            </a:solidFill>
+          </a:ln>
+        </p:spPr>
+        <p:style>
+          <a:lnRef idx="2">
+            <a:schemeClr val="accent1"/>
+          </a:lnRef>
+          <a:fillRef idx="0">
+            <a:schemeClr val="accent1"/>
+          </a:fillRef>
+          <a:effectRef idx="1">
+            <a:schemeClr val="accent1"/>
+          </a:effectRef>
+          <a:fontRef idx="minor">
+            <a:schemeClr val="tx1"/>
+          </a:fontRef>
+        </p:style>
+      </p:cxnSp>
+      <p:sp>
+        <p:nvSpPr>
+          <p:cNvPr id="36" name="円/楕円 35">
+            <a:extLst>
+              <a:ext uri="{FF2B5EF4-FFF2-40B4-BE49-F238E27FC236}">
+                <a16:creationId xmlns:a16="http://schemas.microsoft.com/office/drawing/2014/main" id="{B85D3525-158C-A280-EA72-F53D24992DC5}"/>
+              </a:ext>
+            </a:extLst>
+          </p:cNvPr>
+          <p:cNvSpPr/>
+          <p:nvPr/>
+        </p:nvSpPr>
+        <p:spPr>
+          <a:xfrm>
+            <a:off x="3090041" y="4555942"/>
+            <a:ext cx="268543" cy="268543"/>
+          </a:xfrm>
+          <a:prstGeom prst="ellipse">
+            <a:avLst/>
+          </a:prstGeom>
+          <a:solidFill>
+            <a:srgbClr val="0070C0"/>
+          </a:solidFill>
+          <a:ln>
+            <a:solidFill>
+              <a:srgbClr val="0070C0"/>
+            </a:solidFill>
+          </a:ln>
+        </p:spPr>
+        <p:style>
+          <a:lnRef idx="2">
+            <a:schemeClr val="accent1">
+              <a:shade val="15000"/>
+            </a:schemeClr>
+          </a:lnRef>
+          <a:fillRef idx="1">
+            <a:schemeClr val="accent1"/>
+          </a:fillRef>
+          <a:effectRef idx="0">
+            <a:schemeClr val="accent1"/>
+          </a:effectRef>
+          <a:fontRef idx="minor">
+            <a:schemeClr val="lt1"/>
+          </a:fontRef>
+        </p:style>
+        <p:txBody>
+          <a:bodyPr rtlCol="0" anchor="ctr"/>
+          <a:lstStyle/>
+          <a:p>
+            <a:pPr algn="ctr"/>
+            <a:endParaRPr kumimoji="1" lang="ja-JP" altLang="en-US"/>
+          </a:p>
+        </p:txBody>
+      </p:sp>
+      <p:cxnSp>
+        <p:nvCxnSpPr>
+          <p:cNvPr id="43" name="直線コネクタ 42">
+            <a:extLst>
+              <a:ext uri="{FF2B5EF4-FFF2-40B4-BE49-F238E27FC236}">
+                <a16:creationId xmlns:a16="http://schemas.microsoft.com/office/drawing/2014/main" id="{730C768D-D17F-CD34-86B4-E81F2D361815}"/>
+              </a:ext>
+            </a:extLst>
+          </p:cNvPr>
+          <p:cNvCxnSpPr>
+            <a:cxnSpLocks/>
+          </p:cNvCxnSpPr>
+          <p:nvPr/>
+        </p:nvCxnSpPr>
+        <p:spPr>
+          <a:xfrm>
+            <a:off x="1778800" y="4690214"/>
+            <a:ext cx="1311241" cy="0"/>
+          </a:xfrm>
+          <a:prstGeom prst="line">
+            <a:avLst/>
+          </a:prstGeom>
+          <a:ln w="19050">
+            <a:solidFill>
+              <a:srgbClr val="0070C0"/>
+            </a:solidFill>
+          </a:ln>
+        </p:spPr>
+        <p:style>
+          <a:lnRef idx="2">
+            <a:schemeClr val="accent1"/>
+          </a:lnRef>
+          <a:fillRef idx="0">
+            <a:schemeClr val="accent1"/>
+          </a:fillRef>
+          <a:effectRef idx="1">
+            <a:schemeClr val="accent1"/>
+          </a:effectRef>
+          <a:fontRef idx="minor">
+            <a:schemeClr val="tx1"/>
+          </a:fontRef>
+        </p:style>
+      </p:cxnSp>
+      <p:cxnSp>
+        <p:nvCxnSpPr>
+          <p:cNvPr id="50" name="直線矢印コネクタ 49">
+            <a:extLst>
+              <a:ext uri="{FF2B5EF4-FFF2-40B4-BE49-F238E27FC236}">
+                <a16:creationId xmlns:a16="http://schemas.microsoft.com/office/drawing/2014/main" id="{1D4C3B7F-B418-BC74-A9B4-910D5A4F0EAD}"/>
+              </a:ext>
+            </a:extLst>
+          </p:cNvPr>
+          <p:cNvCxnSpPr>
+            <a:cxnSpLocks/>
+          </p:cNvCxnSpPr>
+          <p:nvPr/>
+        </p:nvCxnSpPr>
+        <p:spPr>
+          <a:xfrm flipV="1">
+            <a:off x="3460615" y="4682502"/>
+            <a:ext cx="2727641" cy="7711"/>
+          </a:xfrm>
+          <a:prstGeom prst="straightConnector1">
+            <a:avLst/>
+          </a:prstGeom>
+          <a:ln w="38100">
+            <a:solidFill>
+              <a:srgbClr val="00B050"/>
+            </a:solidFill>
+            <a:tailEnd type="triangle"/>
+          </a:ln>
+        </p:spPr>
+        <p:style>
+          <a:lnRef idx="2">
+            <a:schemeClr val="accent1"/>
+          </a:lnRef>
+          <a:fillRef idx="0">
+            <a:schemeClr val="accent1"/>
+          </a:fillRef>
+          <a:effectRef idx="1">
+            <a:schemeClr val="accent1"/>
+          </a:effectRef>
+          <a:fontRef idx="minor">
+            <a:schemeClr val="tx1"/>
+          </a:fontRef>
+        </p:style>
+      </p:cxnSp>
+      <p:sp>
+        <p:nvSpPr>
+          <p:cNvPr id="53" name="テキスト ボックス 52">
+            <a:extLst>
+              <a:ext uri="{FF2B5EF4-FFF2-40B4-BE49-F238E27FC236}">
+                <a16:creationId xmlns:a16="http://schemas.microsoft.com/office/drawing/2014/main" id="{BD5E6571-DD80-31CF-15E8-83038C1C93F1}"/>
+              </a:ext>
+            </a:extLst>
+          </p:cNvPr>
+          <p:cNvSpPr txBox="1"/>
+          <p:nvPr/>
+        </p:nvSpPr>
+        <p:spPr>
+          <a:xfrm>
+            <a:off x="2762270" y="4834015"/>
+            <a:ext cx="1067921" cy="338554"/>
+          </a:xfrm>
+          <a:prstGeom prst="rect">
+            <a:avLst/>
+          </a:prstGeom>
+          <a:noFill/>
+        </p:spPr>
+        <p:txBody>
+          <a:bodyPr wrap="none" rtlCol="0">
+            <a:spAutoFit/>
+          </a:bodyPr>
+          <a:lstStyle/>
+          <a:p>
+            <a:r>
+              <a:rPr lang="en-US" altLang="ja-JP" sz="1600" dirty="0"/>
+              <a:t>VNet</a:t>
+            </a:r>
+            <a:r>
+              <a:rPr lang="ja-JP" altLang="en-US" sz="1600"/>
+              <a:t>統合</a:t>
+            </a:r>
+            <a:endParaRPr kumimoji="1" lang="ja-JP" altLang="en-US" sz="1600"/>
+          </a:p>
+        </p:txBody>
+      </p:sp>
+      <p:sp>
+        <p:nvSpPr>
+          <p:cNvPr id="60" name="円/楕円 59">
+            <a:extLst>
+              <a:ext uri="{FF2B5EF4-FFF2-40B4-BE49-F238E27FC236}">
+                <a16:creationId xmlns:a16="http://schemas.microsoft.com/office/drawing/2014/main" id="{7201B554-2992-A8FA-1034-D51D2220A3AF}"/>
+              </a:ext>
+            </a:extLst>
+          </p:cNvPr>
+          <p:cNvSpPr/>
+          <p:nvPr/>
+        </p:nvSpPr>
+        <p:spPr>
+          <a:xfrm>
+            <a:off x="6747610" y="4551408"/>
+            <a:ext cx="268543" cy="268543"/>
+          </a:xfrm>
+          <a:prstGeom prst="ellipse">
+            <a:avLst/>
+          </a:prstGeom>
+          <a:solidFill>
+            <a:srgbClr val="7030A0"/>
+          </a:solidFill>
+          <a:ln>
+            <a:noFill/>
+          </a:ln>
+        </p:spPr>
+        <p:style>
+          <a:lnRef idx="2">
+            <a:schemeClr val="accent1">
+              <a:shade val="15000"/>
+            </a:schemeClr>
+          </a:lnRef>
+          <a:fillRef idx="1">
+            <a:schemeClr val="accent1"/>
+          </a:fillRef>
+          <a:effectRef idx="0">
+            <a:schemeClr val="accent1"/>
+          </a:effectRef>
+          <a:fontRef idx="minor">
+            <a:schemeClr val="lt1"/>
+          </a:fontRef>
+        </p:style>
+        <p:txBody>
+          <a:bodyPr rtlCol="0" anchor="ctr"/>
+          <a:lstStyle/>
+          <a:p>
+            <a:pPr algn="ctr"/>
+            <a:endParaRPr kumimoji="1" lang="ja-JP" altLang="en-US"/>
+          </a:p>
+        </p:txBody>
+      </p:sp>
+      <p:sp>
+        <p:nvSpPr>
+          <p:cNvPr id="61" name="テキスト ボックス 60">
+            <a:extLst>
+              <a:ext uri="{FF2B5EF4-FFF2-40B4-BE49-F238E27FC236}">
+                <a16:creationId xmlns:a16="http://schemas.microsoft.com/office/drawing/2014/main" id="{B605851F-EA88-2CF6-5FF9-12F06BC85205}"/>
+              </a:ext>
+            </a:extLst>
+          </p:cNvPr>
+          <p:cNvSpPr txBox="1"/>
+          <p:nvPr/>
+        </p:nvSpPr>
+        <p:spPr>
+          <a:xfrm>
+            <a:off x="6136365" y="4007981"/>
+            <a:ext cx="2025783" cy="461665"/>
+          </a:xfrm>
+          <a:prstGeom prst="rect">
+            <a:avLst/>
+          </a:prstGeom>
+          <a:noFill/>
+        </p:spPr>
+        <p:txBody>
+          <a:bodyPr wrap="square" rtlCol="0">
+            <a:spAutoFit/>
+          </a:bodyPr>
+          <a:lstStyle/>
+          <a:p>
+            <a:r>
+              <a:rPr kumimoji="1" lang="en-US" altLang="ja-JP" sz="1200" dirty="0"/>
+              <a:t>Completions</a:t>
+            </a:r>
+          </a:p>
+          <a:p>
+            <a:r>
+              <a:rPr kumimoji="1" lang="en-US" altLang="ja-JP" sz="1200" dirty="0"/>
+              <a:t>extensions API</a:t>
+            </a:r>
+          </a:p>
+        </p:txBody>
+      </p:sp>
+      <p:cxnSp>
+        <p:nvCxnSpPr>
+          <p:cNvPr id="62" name="直線コネクタ 61">
+            <a:extLst>
+              <a:ext uri="{FF2B5EF4-FFF2-40B4-BE49-F238E27FC236}">
+                <a16:creationId xmlns:a16="http://schemas.microsoft.com/office/drawing/2014/main" id="{F6027F64-22D5-AF54-7600-B728BD757757}"/>
+              </a:ext>
+            </a:extLst>
+          </p:cNvPr>
+          <p:cNvCxnSpPr>
+            <a:cxnSpLocks/>
+            <a:stCxn id="63" idx="3"/>
+          </p:cNvCxnSpPr>
+          <p:nvPr/>
+        </p:nvCxnSpPr>
+        <p:spPr>
+          <a:xfrm>
+            <a:off x="6759982" y="4682502"/>
+            <a:ext cx="1776782" cy="3178"/>
+          </a:xfrm>
+          <a:prstGeom prst="line">
+            <a:avLst/>
+          </a:prstGeom>
+          <a:ln w="19050">
+            <a:solidFill>
+              <a:srgbClr val="7030A0"/>
+            </a:solidFill>
+          </a:ln>
+        </p:spPr>
+        <p:style>
+          <a:lnRef idx="2">
+            <a:schemeClr val="accent1"/>
+          </a:lnRef>
+          <a:fillRef idx="0">
+            <a:schemeClr val="accent1"/>
+          </a:fillRef>
+          <a:effectRef idx="1">
+            <a:schemeClr val="accent1"/>
+          </a:effectRef>
+          <a:fontRef idx="minor">
+            <a:schemeClr val="tx1"/>
+          </a:fontRef>
+        </p:style>
+      </p:cxnSp>
+      <p:pic>
+        <p:nvPicPr>
+          <p:cNvPr id="63" name="グラフィックス 62">
+            <a:extLst>
+              <a:ext uri="{FF2B5EF4-FFF2-40B4-BE49-F238E27FC236}">
+                <a16:creationId xmlns:a16="http://schemas.microsoft.com/office/drawing/2014/main" id="{A8A28187-1CD0-0977-B74F-6503737FA423}"/>
+              </a:ext>
+            </a:extLst>
+          </p:cNvPr>
+          <p:cNvPicPr>
+            <a:picLocks noChangeAspect="1"/>
+          </p:cNvPicPr>
+          <p:nvPr/>
+        </p:nvPicPr>
+        <p:blipFill>
+          <a:blip r:embed="rId7">
+            <a:extLst>
+              <a:ext uri="{96DAC541-7B7A-43D3-8B79-37D633B846F1}">
+                <asvg:svgBlip xmlns:asvg="http://schemas.microsoft.com/office/drawing/2016/SVG/main" r:embed="rId8"/>
+              </a:ext>
+            </a:extLst>
+          </a:blip>
+          <a:stretch>
+            <a:fillRect/>
+          </a:stretch>
+        </p:blipFill>
+        <p:spPr>
+          <a:xfrm>
+            <a:off x="6188256" y="4396639"/>
+            <a:ext cx="571726" cy="571726"/>
+          </a:xfrm>
+          <a:prstGeom prst="rect">
+            <a:avLst/>
+          </a:prstGeom>
+        </p:spPr>
+      </p:pic>
+      <p:sp>
+        <p:nvSpPr>
+          <p:cNvPr id="1024" name="テキスト ボックス 1023">
+            <a:extLst>
+              <a:ext uri="{FF2B5EF4-FFF2-40B4-BE49-F238E27FC236}">
+                <a16:creationId xmlns:a16="http://schemas.microsoft.com/office/drawing/2014/main" id="{89E4422B-4C5A-B965-4F90-39DDB4838EB5}"/>
+              </a:ext>
+            </a:extLst>
+          </p:cNvPr>
+          <p:cNvSpPr txBox="1"/>
+          <p:nvPr/>
+        </p:nvSpPr>
+        <p:spPr>
+          <a:xfrm>
+            <a:off x="5628902" y="4925783"/>
+            <a:ext cx="1754006" cy="338554"/>
+          </a:xfrm>
+          <a:prstGeom prst="rect">
+            <a:avLst/>
+          </a:prstGeom>
+          <a:noFill/>
+        </p:spPr>
+        <p:txBody>
+          <a:bodyPr wrap="none" rtlCol="0">
+            <a:spAutoFit/>
+          </a:bodyPr>
+          <a:lstStyle/>
+          <a:p>
+            <a:r>
+              <a:rPr kumimoji="1" lang="en-US" altLang="ja-JP" sz="1600" dirty="0"/>
+              <a:t>Private Endpoint</a:t>
+            </a:r>
+            <a:endParaRPr kumimoji="1" lang="ja-JP" altLang="en-US" sz="1600"/>
+          </a:p>
+        </p:txBody>
+      </p:sp>
+      <p:sp>
+        <p:nvSpPr>
+          <p:cNvPr id="13" name="正方形/長方形 12">
+            <a:extLst>
+              <a:ext uri="{FF2B5EF4-FFF2-40B4-BE49-F238E27FC236}">
+                <a16:creationId xmlns:a16="http://schemas.microsoft.com/office/drawing/2014/main" id="{039CC20E-26B5-73F1-A478-EBB65342B057}"/>
+              </a:ext>
+            </a:extLst>
+          </p:cNvPr>
+          <p:cNvSpPr/>
+          <p:nvPr/>
+        </p:nvSpPr>
+        <p:spPr>
+          <a:xfrm>
+            <a:off x="7958250" y="1039400"/>
+            <a:ext cx="3504002" cy="2074523"/>
+          </a:xfrm>
+          <a:prstGeom prst="rect">
+            <a:avLst/>
+          </a:prstGeom>
+          <a:noFill/>
+          <a:ln>
+            <a:solidFill>
+              <a:srgbClr val="0070C0"/>
+            </a:solidFill>
+          </a:ln>
+        </p:spPr>
+        <p:style>
+          <a:lnRef idx="2">
+            <a:schemeClr val="accent1">
+              <a:shade val="15000"/>
+            </a:schemeClr>
+          </a:lnRef>
+          <a:fillRef idx="1">
+            <a:schemeClr val="accent1"/>
+          </a:fillRef>
+          <a:effectRef idx="0">
+            <a:schemeClr val="accent1"/>
+          </a:effectRef>
+          <a:fontRef idx="minor">
+            <a:schemeClr val="lt1"/>
+          </a:fontRef>
+        </p:style>
+        <p:txBody>
+          <a:bodyPr rtlCol="0" anchor="ctr"/>
+          <a:lstStyle/>
+          <a:p>
+            <a:pPr algn="ctr"/>
+            <a:endParaRPr kumimoji="1" lang="ja-JP" altLang="en-US"/>
+          </a:p>
+        </p:txBody>
+      </p:sp>
+      <p:pic>
+        <p:nvPicPr>
+          <p:cNvPr id="14" name="グラフィックス 13">
+            <a:extLst>
+              <a:ext uri="{FF2B5EF4-FFF2-40B4-BE49-F238E27FC236}">
+                <a16:creationId xmlns:a16="http://schemas.microsoft.com/office/drawing/2014/main" id="{2F01C745-A328-40E0-8E37-19C0DBFE946C}"/>
+              </a:ext>
+            </a:extLst>
+          </p:cNvPr>
+          <p:cNvPicPr>
+            <a:picLocks noChangeAspect="1"/>
+          </p:cNvPicPr>
+          <p:nvPr/>
+        </p:nvPicPr>
+        <p:blipFill>
+          <a:blip r:embed="rId5">
+            <a:extLst>
+              <a:ext uri="{96DAC541-7B7A-43D3-8B79-37D633B846F1}">
+                <asvg:svgBlip xmlns:asvg="http://schemas.microsoft.com/office/drawing/2016/SVG/main" r:embed="rId6"/>
+              </a:ext>
+            </a:extLst>
+          </a:blip>
+          <a:stretch>
+            <a:fillRect/>
+          </a:stretch>
+        </p:blipFill>
+        <p:spPr>
+          <a:xfrm>
+            <a:off x="8006185" y="996775"/>
+            <a:ext cx="512965" cy="512965"/>
+          </a:xfrm>
+          <a:prstGeom prst="rect">
+            <a:avLst/>
+          </a:prstGeom>
+        </p:spPr>
+      </p:pic>
+      <p:sp>
+        <p:nvSpPr>
+          <p:cNvPr id="16" name="テキスト ボックス 15">
+            <a:extLst>
+              <a:ext uri="{FF2B5EF4-FFF2-40B4-BE49-F238E27FC236}">
+                <a16:creationId xmlns:a16="http://schemas.microsoft.com/office/drawing/2014/main" id="{37B6B474-404B-A7D2-C167-B914DBF06BE3}"/>
+              </a:ext>
+            </a:extLst>
+          </p:cNvPr>
+          <p:cNvSpPr txBox="1"/>
+          <p:nvPr/>
+        </p:nvSpPr>
+        <p:spPr>
+          <a:xfrm>
+            <a:off x="8498645" y="1083981"/>
+            <a:ext cx="2651688" cy="338554"/>
+          </a:xfrm>
+          <a:prstGeom prst="rect">
+            <a:avLst/>
+          </a:prstGeom>
+          <a:noFill/>
+        </p:spPr>
+        <p:txBody>
+          <a:bodyPr wrap="none" rtlCol="0">
+            <a:spAutoFit/>
+          </a:bodyPr>
+          <a:lstStyle/>
+          <a:p>
+            <a:r>
+              <a:rPr kumimoji="1" lang="en-US" altLang="ja-JP" sz="1600" dirty="0"/>
+              <a:t>VNet(</a:t>
+            </a:r>
+            <a:r>
+              <a:rPr kumimoji="1" lang="ja-JP" altLang="en-US" sz="1600"/>
+              <a:t>プライベート</a:t>
+            </a:r>
+            <a:r>
+              <a:rPr kumimoji="1" lang="en-US" altLang="ja-JP" sz="1600" dirty="0"/>
+              <a:t>IP</a:t>
+            </a:r>
+            <a:r>
+              <a:rPr kumimoji="1" lang="ja-JP" altLang="en-US" sz="1600"/>
+              <a:t>空間</a:t>
+            </a:r>
+            <a:r>
+              <a:rPr kumimoji="1" lang="en-US" altLang="ja-JP" sz="1600" dirty="0"/>
+              <a:t>)</a:t>
+            </a:r>
+            <a:endParaRPr kumimoji="1" lang="ja-JP" altLang="en-US" sz="1600"/>
+          </a:p>
+        </p:txBody>
+      </p:sp>
+      <p:sp>
+        <p:nvSpPr>
+          <p:cNvPr id="17" name="テキスト ボックス 16">
+            <a:extLst>
+              <a:ext uri="{FF2B5EF4-FFF2-40B4-BE49-F238E27FC236}">
+                <a16:creationId xmlns:a16="http://schemas.microsoft.com/office/drawing/2014/main" id="{714056D6-DDC1-ADAA-B5F4-34E4F308B07F}"/>
+              </a:ext>
+            </a:extLst>
+          </p:cNvPr>
+          <p:cNvSpPr txBox="1"/>
+          <p:nvPr/>
+        </p:nvSpPr>
+        <p:spPr>
+          <a:xfrm>
+            <a:off x="7957527" y="680423"/>
+            <a:ext cx="2377574" cy="338554"/>
+          </a:xfrm>
+          <a:prstGeom prst="rect">
+            <a:avLst/>
+          </a:prstGeom>
+          <a:noFill/>
+        </p:spPr>
+        <p:txBody>
+          <a:bodyPr wrap="none" rtlCol="0">
+            <a:spAutoFit/>
+          </a:bodyPr>
+          <a:lstStyle/>
+          <a:p>
+            <a:r>
+              <a:rPr kumimoji="1" lang="en-US" altLang="ja-JP" sz="1600" dirty="0"/>
+              <a:t>Microsoft </a:t>
+            </a:r>
+            <a:r>
+              <a:rPr kumimoji="1" lang="ja-JP" altLang="en-US" sz="1600"/>
+              <a:t>管理のエリア</a:t>
+            </a:r>
+          </a:p>
+        </p:txBody>
+      </p:sp>
+      <p:cxnSp>
+        <p:nvCxnSpPr>
+          <p:cNvPr id="22" name="直線矢印コネクタ 21">
+            <a:extLst>
+              <a:ext uri="{FF2B5EF4-FFF2-40B4-BE49-F238E27FC236}">
+                <a16:creationId xmlns:a16="http://schemas.microsoft.com/office/drawing/2014/main" id="{C76A2182-57CF-C512-7B0E-DEEAA1528F98}"/>
+              </a:ext>
+            </a:extLst>
+          </p:cNvPr>
+          <p:cNvCxnSpPr>
+            <a:cxnSpLocks/>
+          </p:cNvCxnSpPr>
+          <p:nvPr/>
+        </p:nvCxnSpPr>
+        <p:spPr>
+          <a:xfrm flipV="1">
+            <a:off x="9080939" y="2531472"/>
+            <a:ext cx="0" cy="1515861"/>
+          </a:xfrm>
+          <a:prstGeom prst="straightConnector1">
+            <a:avLst/>
+          </a:prstGeom>
+          <a:ln w="38100">
+            <a:solidFill>
+              <a:srgbClr val="7030A0"/>
+            </a:solidFill>
+            <a:headEnd type="triangle"/>
+            <a:tailEnd type="triangle"/>
+          </a:ln>
+        </p:spPr>
+        <p:style>
+          <a:lnRef idx="2">
+            <a:schemeClr val="accent1"/>
+          </a:lnRef>
+          <a:fillRef idx="0">
+            <a:schemeClr val="accent1"/>
+          </a:fillRef>
+          <a:effectRef idx="1">
+            <a:schemeClr val="accent1"/>
+          </a:effectRef>
+          <a:fontRef idx="minor">
+            <a:schemeClr val="tx1"/>
+          </a:fontRef>
+        </p:style>
+      </p:cxnSp>
+      <p:sp>
+        <p:nvSpPr>
+          <p:cNvPr id="30" name="四角形吹き出し 29">
+            <a:extLst>
+              <a:ext uri="{FF2B5EF4-FFF2-40B4-BE49-F238E27FC236}">
+                <a16:creationId xmlns:a16="http://schemas.microsoft.com/office/drawing/2014/main" id="{3B715369-070D-8ED1-99BB-791A597CA67B}"/>
+              </a:ext>
+            </a:extLst>
+          </p:cNvPr>
+          <p:cNvSpPr/>
+          <p:nvPr/>
+        </p:nvSpPr>
+        <p:spPr>
+          <a:xfrm>
+            <a:off x="4834914" y="273344"/>
+            <a:ext cx="2841950" cy="788903"/>
+          </a:xfrm>
+          <a:prstGeom prst="wedgeRectCallout">
+            <a:avLst>
+              <a:gd name="adj1" fmla="val -27050"/>
+              <a:gd name="adj2" fmla="val 149276"/>
+            </a:avLst>
+          </a:prstGeom>
+          <a:solidFill>
+            <a:srgbClr val="FF0000"/>
+          </a:solidFill>
+          <a:ln>
+            <a:noFill/>
+          </a:ln>
+        </p:spPr>
+        <p:style>
+          <a:lnRef idx="2">
+            <a:schemeClr val="accent1">
+              <a:shade val="15000"/>
+            </a:schemeClr>
+          </a:lnRef>
+          <a:fillRef idx="1">
+            <a:schemeClr val="accent1"/>
+          </a:fillRef>
+          <a:effectRef idx="0">
+            <a:schemeClr val="accent1"/>
+          </a:effectRef>
+          <a:fontRef idx="minor">
+            <a:schemeClr val="lt1"/>
+          </a:fontRef>
+        </p:style>
+        <p:txBody>
+          <a:bodyPr rtlCol="0" anchor="ctr"/>
+          <a:lstStyle/>
+          <a:p>
+            <a:r>
+              <a:rPr kumimoji="1" lang="ja-JP" altLang="en-US" sz="1600"/>
+              <a:t>申請が承認されるとプライベートリンクのリクエストが飛んでくる</a:t>
+            </a:r>
+            <a:endParaRPr kumimoji="1" lang="ja-JP" altLang="en-US"/>
+          </a:p>
+        </p:txBody>
+      </p:sp>
+      <p:sp>
+        <p:nvSpPr>
+          <p:cNvPr id="33" name="テキスト ボックス 32">
+            <a:extLst>
+              <a:ext uri="{FF2B5EF4-FFF2-40B4-BE49-F238E27FC236}">
+                <a16:creationId xmlns:a16="http://schemas.microsoft.com/office/drawing/2014/main" id="{0F2A5E2E-1933-717B-2057-C4ACCA0469F3}"/>
+              </a:ext>
+            </a:extLst>
+          </p:cNvPr>
+          <p:cNvSpPr txBox="1"/>
+          <p:nvPr/>
+        </p:nvSpPr>
+        <p:spPr>
+          <a:xfrm>
+            <a:off x="5701369" y="1887279"/>
+            <a:ext cx="1314784" cy="338554"/>
+          </a:xfrm>
+          <a:prstGeom prst="rect">
+            <a:avLst/>
+          </a:prstGeom>
+          <a:noFill/>
+        </p:spPr>
+        <p:txBody>
+          <a:bodyPr wrap="none" rtlCol="0">
+            <a:spAutoFit/>
+          </a:bodyPr>
+          <a:lstStyle/>
+          <a:p>
+            <a:r>
+              <a:rPr kumimoji="1" lang="en-US" altLang="ja-JP" sz="1600" dirty="0"/>
+              <a:t>Private Link</a:t>
+            </a:r>
+            <a:endParaRPr kumimoji="1" lang="ja-JP" altLang="en-US" sz="1600"/>
+          </a:p>
+        </p:txBody>
+      </p:sp>
+    </p:spTree>
+    <p:extLst>
+      <p:ext uri="{BB962C8B-B14F-4D97-AF65-F5344CB8AC3E}">
+        <p14:creationId xmlns:p14="http://schemas.microsoft.com/office/powerpoint/2010/main" val="547131261"/>
+      </p:ext>
+    </p:extLst>
+  </p:cSld>
+  <p:clrMapOvr>
+    <a:masterClrMapping/>
+  </p:clrMapOvr>
+</p:sld>
+</file>
+
+<file path=ppt/slides/slide4.xml><?xml version="1.0" encoding="utf-8"?>
 <p:sld xmlns:a="http://schemas.openxmlformats.org/drawingml/2006/main" xmlns:r="http://schemas.openxmlformats.org/officeDocument/2006/relationships" xmlns:p="http://schemas.openxmlformats.org/presentationml/2006/main">
   <p:cSld>
     <p:spTree>

</xml_diff>